<commit_message>
250116 1147 Add Layout and styles
</commit_message>
<xml_diff>
--- a/Hotel_Project.pptx
+++ b/Hotel_Project.pptx
@@ -11,6 +11,7 @@
     <p:sldId id="259" r:id="rId5"/>
     <p:sldId id="260" r:id="rId6"/>
     <p:sldId id="261" r:id="rId7"/>
+    <p:sldId id="262" r:id="rId8"/>
   </p:sldIdLst>
   <p:sldSz cx="12192000" cy="6858000"/>
   <p:notesSz cx="6858000" cy="9144000"/>
@@ -264,7 +265,7 @@
           <a:p>
             <a:fld id="{22B6DE1D-027E-44C6-BFDB-527B0CDE2B48}" type="datetimeFigureOut">
               <a:rPr lang="ko-KR" altLang="en-US" smtClean="0"/>
-              <a:t>2025-01-09</a:t>
+              <a:t>2025-01-16</a:t>
             </a:fld>
             <a:endParaRPr lang="ko-KR" altLang="en-US"/>
           </a:p>
@@ -462,7 +463,7 @@
           <a:p>
             <a:fld id="{22B6DE1D-027E-44C6-BFDB-527B0CDE2B48}" type="datetimeFigureOut">
               <a:rPr lang="ko-KR" altLang="en-US" smtClean="0"/>
-              <a:t>2025-01-09</a:t>
+              <a:t>2025-01-16</a:t>
             </a:fld>
             <a:endParaRPr lang="ko-KR" altLang="en-US"/>
           </a:p>
@@ -670,7 +671,7 @@
           <a:p>
             <a:fld id="{22B6DE1D-027E-44C6-BFDB-527B0CDE2B48}" type="datetimeFigureOut">
               <a:rPr lang="ko-KR" altLang="en-US" smtClean="0"/>
-              <a:t>2025-01-09</a:t>
+              <a:t>2025-01-16</a:t>
             </a:fld>
             <a:endParaRPr lang="ko-KR" altLang="en-US"/>
           </a:p>
@@ -868,7 +869,7 @@
           <a:p>
             <a:fld id="{22B6DE1D-027E-44C6-BFDB-527B0CDE2B48}" type="datetimeFigureOut">
               <a:rPr lang="ko-KR" altLang="en-US" smtClean="0"/>
-              <a:t>2025-01-09</a:t>
+              <a:t>2025-01-16</a:t>
             </a:fld>
             <a:endParaRPr lang="ko-KR" altLang="en-US"/>
           </a:p>
@@ -1143,7 +1144,7 @@
           <a:p>
             <a:fld id="{22B6DE1D-027E-44C6-BFDB-527B0CDE2B48}" type="datetimeFigureOut">
               <a:rPr lang="ko-KR" altLang="en-US" smtClean="0"/>
-              <a:t>2025-01-09</a:t>
+              <a:t>2025-01-16</a:t>
             </a:fld>
             <a:endParaRPr lang="ko-KR" altLang="en-US"/>
           </a:p>
@@ -1408,7 +1409,7 @@
           <a:p>
             <a:fld id="{22B6DE1D-027E-44C6-BFDB-527B0CDE2B48}" type="datetimeFigureOut">
               <a:rPr lang="ko-KR" altLang="en-US" smtClean="0"/>
-              <a:t>2025-01-09</a:t>
+              <a:t>2025-01-16</a:t>
             </a:fld>
             <a:endParaRPr lang="ko-KR" altLang="en-US"/>
           </a:p>
@@ -1820,7 +1821,7 @@
           <a:p>
             <a:fld id="{22B6DE1D-027E-44C6-BFDB-527B0CDE2B48}" type="datetimeFigureOut">
               <a:rPr lang="ko-KR" altLang="en-US" smtClean="0"/>
-              <a:t>2025-01-09</a:t>
+              <a:t>2025-01-16</a:t>
             </a:fld>
             <a:endParaRPr lang="ko-KR" altLang="en-US"/>
           </a:p>
@@ -1961,7 +1962,7 @@
           <a:p>
             <a:fld id="{22B6DE1D-027E-44C6-BFDB-527B0CDE2B48}" type="datetimeFigureOut">
               <a:rPr lang="ko-KR" altLang="en-US" smtClean="0"/>
-              <a:t>2025-01-09</a:t>
+              <a:t>2025-01-16</a:t>
             </a:fld>
             <a:endParaRPr lang="ko-KR" altLang="en-US"/>
           </a:p>
@@ -2074,7 +2075,7 @@
           <a:p>
             <a:fld id="{22B6DE1D-027E-44C6-BFDB-527B0CDE2B48}" type="datetimeFigureOut">
               <a:rPr lang="ko-KR" altLang="en-US" smtClean="0"/>
-              <a:t>2025-01-09</a:t>
+              <a:t>2025-01-16</a:t>
             </a:fld>
             <a:endParaRPr lang="ko-KR" altLang="en-US"/>
           </a:p>
@@ -2385,7 +2386,7 @@
           <a:p>
             <a:fld id="{22B6DE1D-027E-44C6-BFDB-527B0CDE2B48}" type="datetimeFigureOut">
               <a:rPr lang="ko-KR" altLang="en-US" smtClean="0"/>
-              <a:t>2025-01-09</a:t>
+              <a:t>2025-01-16</a:t>
             </a:fld>
             <a:endParaRPr lang="ko-KR" altLang="en-US"/>
           </a:p>
@@ -2673,7 +2674,7 @@
           <a:p>
             <a:fld id="{22B6DE1D-027E-44C6-BFDB-527B0CDE2B48}" type="datetimeFigureOut">
               <a:rPr lang="ko-KR" altLang="en-US" smtClean="0"/>
-              <a:t>2025-01-09</a:t>
+              <a:t>2025-01-16</a:t>
             </a:fld>
             <a:endParaRPr lang="ko-KR" altLang="en-US"/>
           </a:p>
@@ -2914,7 +2915,7 @@
           <a:p>
             <a:fld id="{22B6DE1D-027E-44C6-BFDB-527B0CDE2B48}" type="datetimeFigureOut">
               <a:rPr lang="ko-KR" altLang="en-US" smtClean="0"/>
-              <a:t>2025-01-09</a:t>
+              <a:t>2025-01-16</a:t>
             </a:fld>
             <a:endParaRPr lang="ko-KR" altLang="en-US"/>
           </a:p>
@@ -37083,6 +37084,303 @@
 </p:sld>
 </file>
 
+<file path=ppt/slides/slide7.xml><?xml version="1.0" encoding="utf-8"?>
+<p:sld xmlns:a="http://schemas.openxmlformats.org/drawingml/2006/main" xmlns:r="http://schemas.openxmlformats.org/officeDocument/2006/relationships" xmlns:p="http://schemas.openxmlformats.org/presentationml/2006/main">
+  <p:cSld>
+    <p:spTree>
+      <p:nvGrpSpPr>
+        <p:cNvPr id="1" name=""/>
+        <p:cNvGrpSpPr/>
+        <p:nvPr/>
+      </p:nvGrpSpPr>
+      <p:grpSpPr>
+        <a:xfrm>
+          <a:off x="0" y="0"/>
+          <a:ext cx="0" cy="0"/>
+          <a:chOff x="0" y="0"/>
+          <a:chExt cx="0" cy="0"/>
+        </a:xfrm>
+      </p:grpSpPr>
+      <p:sp>
+        <p:nvSpPr>
+          <p:cNvPr id="5" name="직사각형 4">
+            <a:extLst>
+              <a:ext uri="{FF2B5EF4-FFF2-40B4-BE49-F238E27FC236}">
+                <a16:creationId xmlns:a16="http://schemas.microsoft.com/office/drawing/2014/main" id="{A680236A-04A5-4FF4-A70A-69012BE8726E}"/>
+              </a:ext>
+            </a:extLst>
+          </p:cNvPr>
+          <p:cNvSpPr/>
+          <p:nvPr/>
+        </p:nvSpPr>
+        <p:spPr>
+          <a:xfrm>
+            <a:off x="-1" y="0"/>
+            <a:ext cx="12192001" cy="928914"/>
+          </a:xfrm>
+          <a:prstGeom prst="rect">
+            <a:avLst/>
+          </a:prstGeom>
+          <a:solidFill>
+            <a:srgbClr val="333333"/>
+          </a:solidFill>
+          <a:ln>
+            <a:noFill/>
+          </a:ln>
+        </p:spPr>
+        <p:style>
+          <a:lnRef idx="2">
+            <a:schemeClr val="accent1">
+              <a:shade val="50000"/>
+            </a:schemeClr>
+          </a:lnRef>
+          <a:fillRef idx="1">
+            <a:schemeClr val="accent1"/>
+          </a:fillRef>
+          <a:effectRef idx="0">
+            <a:schemeClr val="accent1"/>
+          </a:effectRef>
+          <a:fontRef idx="minor">
+            <a:schemeClr val="lt1"/>
+          </a:fontRef>
+        </p:style>
+        <p:txBody>
+          <a:bodyPr rtlCol="0" anchor="ctr"/>
+          <a:lstStyle/>
+          <a:p>
+            <a:pPr algn="ctr"/>
+            <a:endParaRPr lang="ko-KR" altLang="en-US"/>
+          </a:p>
+        </p:txBody>
+      </p:sp>
+      <p:sp>
+        <p:nvSpPr>
+          <p:cNvPr id="15" name="TextBox 14">
+            <a:extLst>
+              <a:ext uri="{FF2B5EF4-FFF2-40B4-BE49-F238E27FC236}">
+                <a16:creationId xmlns:a16="http://schemas.microsoft.com/office/drawing/2014/main" id="{6E31398E-09B2-45D9-952F-E0D97C88E73D}"/>
+              </a:ext>
+            </a:extLst>
+          </p:cNvPr>
+          <p:cNvSpPr txBox="1"/>
+          <p:nvPr/>
+        </p:nvSpPr>
+        <p:spPr>
+          <a:xfrm>
+            <a:off x="114300" y="202847"/>
+            <a:ext cx="2951449" cy="523220"/>
+          </a:xfrm>
+          <a:prstGeom prst="rect">
+            <a:avLst/>
+          </a:prstGeom>
+          <a:noFill/>
+        </p:spPr>
+        <p:txBody>
+          <a:bodyPr wrap="none" rtlCol="0">
+            <a:spAutoFit/>
+          </a:bodyPr>
+          <a:lstStyle/>
+          <a:p>
+            <a:r>
+              <a:rPr lang="ko-KR" altLang="en-US" sz="2800">
+                <a:solidFill>
+                  <a:schemeClr val="bg1"/>
+                </a:solidFill>
+              </a:rPr>
+              <a:t>호텔 예약 시스템</a:t>
+            </a:r>
+          </a:p>
+        </p:txBody>
+      </p:sp>
+      <p:sp>
+        <p:nvSpPr>
+          <p:cNvPr id="20" name="TextBox 19">
+            <a:extLst>
+              <a:ext uri="{FF2B5EF4-FFF2-40B4-BE49-F238E27FC236}">
+                <a16:creationId xmlns:a16="http://schemas.microsoft.com/office/drawing/2014/main" id="{623FCEF4-37C7-4453-9E9E-3B26CA5E0508}"/>
+              </a:ext>
+            </a:extLst>
+          </p:cNvPr>
+          <p:cNvSpPr txBox="1"/>
+          <p:nvPr/>
+        </p:nvSpPr>
+        <p:spPr>
+          <a:xfrm>
+            <a:off x="6572250" y="295180"/>
+            <a:ext cx="2840842" cy="338554"/>
+          </a:xfrm>
+          <a:prstGeom prst="rect">
+            <a:avLst/>
+          </a:prstGeom>
+          <a:noFill/>
+        </p:spPr>
+        <p:txBody>
+          <a:bodyPr wrap="none" rtlCol="0">
+            <a:spAutoFit/>
+          </a:bodyPr>
+          <a:lstStyle/>
+          <a:p>
+            <a:r>
+              <a:rPr lang="ko-KR" altLang="en-US" sz="1600">
+                <a:solidFill>
+                  <a:schemeClr val="bg1"/>
+                </a:solidFill>
+              </a:rPr>
+              <a:t>홈 </a:t>
+            </a:r>
+            <a:r>
+              <a:rPr lang="en-US" altLang="ko-KR" sz="1600">
+                <a:solidFill>
+                  <a:schemeClr val="bg1"/>
+                </a:solidFill>
+              </a:rPr>
+              <a:t>|</a:t>
+            </a:r>
+            <a:r>
+              <a:rPr lang="ko-KR" altLang="en-US" sz="1600">
+                <a:solidFill>
+                  <a:schemeClr val="bg1"/>
+                </a:solidFill>
+              </a:rPr>
+              <a:t> 내 호텔 관리 </a:t>
+            </a:r>
+            <a:r>
+              <a:rPr lang="en-US" altLang="ko-KR" sz="1600">
+                <a:solidFill>
+                  <a:schemeClr val="bg1"/>
+                </a:solidFill>
+              </a:rPr>
+              <a:t>|</a:t>
+            </a:r>
+            <a:r>
+              <a:rPr lang="ko-KR" altLang="en-US" sz="1600">
+                <a:solidFill>
+                  <a:schemeClr val="bg1"/>
+                </a:solidFill>
+              </a:rPr>
+              <a:t> 예약 목록</a:t>
+            </a:r>
+          </a:p>
+        </p:txBody>
+      </p:sp>
+      <p:sp>
+        <p:nvSpPr>
+          <p:cNvPr id="21" name="TextBox 20">
+            <a:extLst>
+              <a:ext uri="{FF2B5EF4-FFF2-40B4-BE49-F238E27FC236}">
+                <a16:creationId xmlns:a16="http://schemas.microsoft.com/office/drawing/2014/main" id="{703676DB-1B5A-4207-9B95-1231BA6988C3}"/>
+              </a:ext>
+            </a:extLst>
+          </p:cNvPr>
+          <p:cNvSpPr txBox="1"/>
+          <p:nvPr/>
+        </p:nvSpPr>
+        <p:spPr>
+          <a:xfrm>
+            <a:off x="10187439" y="141292"/>
+            <a:ext cx="1813317" cy="584775"/>
+          </a:xfrm>
+          <a:prstGeom prst="rect">
+            <a:avLst/>
+          </a:prstGeom>
+          <a:noFill/>
+        </p:spPr>
+        <p:txBody>
+          <a:bodyPr wrap="none" rtlCol="0">
+            <a:spAutoFit/>
+          </a:bodyPr>
+          <a:lstStyle/>
+          <a:p>
+            <a:r>
+              <a:rPr lang="ko-KR" altLang="en-US" sz="1400" b="0" i="0">
+                <a:solidFill>
+                  <a:srgbClr val="FFFFFF"/>
+                </a:solidFill>
+                <a:effectLst/>
+                <a:latin typeface="-apple-system"/>
+              </a:rPr>
+              <a:t>계정</a:t>
+            </a:r>
+            <a:r>
+              <a:rPr lang="en-US" altLang="ko-KR" sz="1400" b="0" i="0">
+                <a:solidFill>
+                  <a:srgbClr val="FFFFFF"/>
+                </a:solidFill>
+                <a:effectLst/>
+                <a:latin typeface="-apple-system"/>
+              </a:rPr>
+              <a:t>: </a:t>
+            </a:r>
+            <a:r>
+              <a:rPr lang="en-US" altLang="ko-KR" sz="1600" b="0" i="0">
+                <a:solidFill>
+                  <a:srgbClr val="FFFFFF"/>
+                </a:solidFill>
+                <a:effectLst/>
+                <a:latin typeface="-apple-system"/>
+              </a:rPr>
+              <a:t>0x8576…7A82</a:t>
+            </a:r>
+            <a:br>
+              <a:rPr lang="en-US" altLang="ko-KR" sz="1600" b="0" i="0">
+                <a:solidFill>
+                  <a:srgbClr val="FFFFFF"/>
+                </a:solidFill>
+                <a:effectLst/>
+                <a:latin typeface="-apple-system"/>
+              </a:rPr>
+            </a:br>
+            <a:r>
+              <a:rPr lang="ko-KR" altLang="en-US" sz="1400" b="0" i="0">
+                <a:solidFill>
+                  <a:srgbClr val="FFFFFF"/>
+                </a:solidFill>
+                <a:effectLst/>
+                <a:latin typeface="-apple-system"/>
+              </a:rPr>
+              <a:t>잔액</a:t>
+            </a:r>
+            <a:r>
+              <a:rPr lang="en-US" altLang="ko-KR" sz="1400" b="0" i="0">
+                <a:solidFill>
+                  <a:srgbClr val="FFFFFF"/>
+                </a:solidFill>
+                <a:effectLst/>
+                <a:latin typeface="-apple-system"/>
+              </a:rPr>
+              <a:t>: </a:t>
+            </a:r>
+            <a:r>
+              <a:rPr lang="en-US" altLang="ko-KR" sz="1600" b="0" i="0">
+                <a:solidFill>
+                  <a:srgbClr val="FFFFFF"/>
+                </a:solidFill>
+                <a:effectLst/>
+                <a:latin typeface="-apple-system"/>
+              </a:rPr>
+              <a:t>99.9996 ETH</a:t>
+            </a:r>
+            <a:endParaRPr lang="ko-KR" altLang="en-US" sz="1600">
+              <a:solidFill>
+                <a:schemeClr val="bg1"/>
+              </a:solidFill>
+            </a:endParaRPr>
+          </a:p>
+        </p:txBody>
+      </p:sp>
+    </p:spTree>
+    <p:extLst>
+      <p:ext uri="{BB962C8B-B14F-4D97-AF65-F5344CB8AC3E}">
+        <p14:creationId xmlns:p14="http://schemas.microsoft.com/office/powerpoint/2010/main" val="1629044234"/>
+      </p:ext>
+    </p:extLst>
+  </p:cSld>
+  <p:clrMapOvr>
+    <a:masterClrMapping/>
+  </p:clrMapOvr>
+</p:sld>
+</file>
+
 <file path=ppt/theme/theme1.xml><?xml version="1.0" encoding="utf-8"?>
 <a:theme xmlns:a="http://schemas.openxmlformats.org/drawingml/2006/main" name="Office 테마">
   <a:themeElements>

</xml_diff>